<commit_message>
Prepared slides for publishing
</commit_message>
<xml_diff>
--- a/slides/06_class_hierarchies.pptx
+++ b/slides/06_class_hierarchies.pptx
@@ -29,8 +29,6 @@
     <p:sldId id="274" r:id="rId26"/>
     <p:sldId id="275" r:id="rId27"/>
     <p:sldId id="276" r:id="rId28"/>
-    <p:sldId id="277" r:id="rId29"/>
-    <p:sldId id="278" r:id="rId30"/>
   </p:sldIdLst>
   <p:sldSz cx="13004800" cy="9753600"/>
   <p:notesSz cx="6858000" cy="9144000"/>
@@ -3900,7 +3898,7 @@
       </p:sp>
       <p:sp>
         <p:nvSpPr>
-          <p:cNvPr id="168" name="Brødtekst"/>
+          <p:cNvPr id="168" name="Structure and organization"/>
           <p:cNvSpPr txBox="1"/>
           <p:nvPr>
             <p:ph type="subTitle" sz="quarter" idx="1"/>
@@ -3916,9 +3914,41 @@
           <a:lstStyle/>
           <a:p>
             <a:pPr/>
-          </a:p>
-        </p:txBody>
-      </p:sp>
+            <a:r>
+              <a:t>Structure and organization</a:t>
+            </a:r>
+          </a:p>
+        </p:txBody>
+      </p:sp>
+      <p:pic>
+        <p:nvPicPr>
+          <p:cNvPr id="169" name="pasted-movie.gif" descr="pasted-movie.gif"/>
+          <p:cNvPicPr>
+            <a:picLocks noChangeAspect="1"/>
+          </p:cNvPicPr>
+          <p:nvPr/>
+        </p:nvPicPr>
+        <p:blipFill>
+          <a:blip r:embed="rId2">
+            <a:extLst/>
+          </a:blip>
+          <a:stretch>
+            <a:fillRect/>
+          </a:stretch>
+        </p:blipFill>
+        <p:spPr>
+          <a:xfrm>
+            <a:off x="7239000" y="6159500"/>
+            <a:ext cx="4495800" cy="3378200"/>
+          </a:xfrm>
+          <a:prstGeom prst="rect">
+            <a:avLst/>
+          </a:prstGeom>
+          <a:ln w="12700">
+            <a:miter lim="400000"/>
+          </a:ln>
+        </p:spPr>
+      </p:pic>
     </p:spTree>
   </p:cSld>
   <p:clrMapOvr>
@@ -3947,7 +3977,7 @@
       </p:grpSpPr>
       <p:sp>
         <p:nvSpPr>
-          <p:cNvPr id="202" name="Automatic imports"/>
+          <p:cNvPr id="203" name="Automatic imports"/>
           <p:cNvSpPr txBox="1"/>
           <p:nvPr>
             <p:ph type="title"/>
@@ -3971,7 +4001,7 @@
       </p:sp>
       <p:sp>
         <p:nvSpPr>
-          <p:cNvPr id="203" name="Scala automatically imports members from the following packages…"/>
+          <p:cNvPr id="204" name="Scala automatically imports members from the following packages…"/>
           <p:cNvSpPr txBox="1"/>
           <p:nvPr>
             <p:ph type="body" sz="half" idx="1"/>
@@ -4050,7 +4080,7 @@
       </p:sp>
       <p:sp>
         <p:nvSpPr>
-          <p:cNvPr id="204" name="Int     scala.Int…"/>
+          <p:cNvPr id="205" name="Int     scala.Int…"/>
           <p:cNvSpPr txBox="1"/>
           <p:nvPr>
             <p:ph type="body" idx="13"/>
@@ -4128,7 +4158,7 @@
       </p:grpSpPr>
       <p:sp>
         <p:nvSpPr>
-          <p:cNvPr id="206" name="Traits in Scala"/>
+          <p:cNvPr id="207" name="Traits in Scala"/>
           <p:cNvSpPr txBox="1"/>
           <p:nvPr>
             <p:ph type="title"/>
@@ -4152,7 +4182,7 @@
       </p:sp>
       <p:sp>
         <p:nvSpPr>
-          <p:cNvPr id="207" name="Composing functionality across class hierarchies"/>
+          <p:cNvPr id="208" name="Composing functionality across class hierarchies"/>
           <p:cNvSpPr txBox="1"/>
           <p:nvPr>
             <p:ph type="body" sz="quarter" idx="1"/>
@@ -4176,7 +4206,7 @@
       </p:sp>
       <p:pic>
         <p:nvPicPr>
-          <p:cNvPr id="208" name="Billede" descr="Billede"/>
+          <p:cNvPr id="209" name="Billede" descr="Billede"/>
           <p:cNvPicPr>
             <a:picLocks noChangeAspect="1"/>
           </p:cNvPicPr>
@@ -4232,49 +4262,13 @@
       </p:grpSpPr>
       <p:sp>
         <p:nvSpPr>
-          <p:cNvPr id="210" name="What about multiple inheritance?"/>
+          <p:cNvPr id="211" name="Class parameters"/>
           <p:cNvSpPr txBox="1"/>
           <p:nvPr>
             <p:ph type="title"/>
           </p:nvPr>
         </p:nvSpPr>
         <p:spPr>
-          <a:xfrm>
-            <a:off x="952500" y="253999"/>
-            <a:ext cx="11099800" cy="1360738"/>
-          </a:xfrm>
-          <a:prstGeom prst="rect">
-            <a:avLst/>
-          </a:prstGeom>
-        </p:spPr>
-        <p:txBody>
-          <a:bodyPr/>
-          <a:lstStyle>
-            <a:lvl1pPr defTabSz="414780">
-              <a:defRPr sz="5600"/>
-            </a:lvl1pPr>
-          </a:lstStyle>
-          <a:p>
-            <a:pPr/>
-            <a:r>
-              <a:t>What about multiple inheritance?</a:t>
-            </a:r>
-          </a:p>
-        </p:txBody>
-      </p:sp>
-      <p:sp>
-        <p:nvSpPr>
-          <p:cNvPr id="211" name="We can build large class hierachies…"/>
-          <p:cNvSpPr txBox="1"/>
-          <p:nvPr>
-            <p:ph type="body" idx="1"/>
-          </p:nvPr>
-        </p:nvSpPr>
-        <p:spPr>
-          <a:xfrm>
-            <a:off x="952499" y="2197100"/>
-            <a:ext cx="11415416" cy="4855270"/>
-          </a:xfrm>
           <a:prstGeom prst="rect">
             <a:avLst/>
           </a:prstGeom>
@@ -4283,120 +4277,234 @@
           <a:bodyPr/>
           <a:lstStyle/>
           <a:p>
-            <a:pPr marL="311150" indent="-311150" defTabSz="408940">
-              <a:spcBef>
-                <a:spcPts val="2900"/>
-              </a:spcBef>
-              <a:defRPr sz="2200"/>
+            <a:pPr/>
+            <a:r>
+              <a:t>Class parameters</a:t>
+            </a:r>
+          </a:p>
+        </p:txBody>
+      </p:sp>
+      <p:sp>
+        <p:nvSpPr>
+          <p:cNvPr id="212" name="You can define a class with parameters (primary constructor)…"/>
+          <p:cNvSpPr txBox="1"/>
+          <p:nvPr>
+            <p:ph type="body" idx="1"/>
+          </p:nvPr>
+        </p:nvSpPr>
+        <p:spPr>
+          <a:xfrm>
+            <a:off x="520700" y="1651000"/>
+            <a:ext cx="11519844" cy="4449516"/>
+          </a:xfrm>
+          <a:prstGeom prst="rect">
+            <a:avLst/>
+          </a:prstGeom>
+        </p:spPr>
+        <p:txBody>
+          <a:bodyPr/>
+          <a:lstStyle/>
+          <a:p>
+            <a:pPr lvl="1" marL="497840" indent="-248920" defTabSz="327152">
+              <a:spcBef>
+                <a:spcPts val="2300"/>
+              </a:spcBef>
+              <a:defRPr sz="1792"/>
             </a:pPr>
             <a:r>
-              <a:t>We can build large class hierachies</a:t>
-            </a:r>
-          </a:p>
-          <a:p>
-            <a:pPr marL="311150" indent="-311150" defTabSz="408940">
-              <a:spcBef>
-                <a:spcPts val="2900"/>
-              </a:spcBef>
-              <a:defRPr sz="2200"/>
+              <a:t>You can define a class with parameters (primary constructor)</a:t>
+            </a:r>
+          </a:p>
+          <a:p>
+            <a:pPr lvl="1" marL="497840" indent="-248920" defTabSz="327152">
+              <a:spcBef>
+                <a:spcPts val="2300"/>
+              </a:spcBef>
+              <a:defRPr sz="1792"/>
             </a:pPr>
             <a:r>
-              <a:t>Scala is a single inheritance language - </a:t>
-            </a:r>
-            <a:r>
-              <a:t>a class can only have </a:t>
-            </a:r>
-            <a:r>
-              <a:rPr b="1"/>
-              <a:t>one superclass</a:t>
-            </a:r>
-          </a:p>
-          <a:p>
-            <a:pPr marL="311150" indent="-311150" defTabSz="408940">
-              <a:spcBef>
-                <a:spcPts val="2900"/>
-              </a:spcBef>
-              <a:defRPr sz="2200"/>
+              <a:t>Primary constructor parameters with val and var are public</a:t>
+            </a:r>
+          </a:p>
+          <a:p>
+            <a:pPr lvl="1" marL="497840" indent="-248920" defTabSz="327152">
+              <a:spcBef>
+                <a:spcPts val="2300"/>
+              </a:spcBef>
+              <a:defRPr sz="1792"/>
             </a:pPr>
             <a:r>
-              <a:t>What if a class has several natural supertypes?</a:t>
-            </a:r>
-          </a:p>
-          <a:p>
-            <a:pPr marL="311150" indent="-311150" defTabSz="408940">
-              <a:spcBef>
-                <a:spcPts val="2900"/>
-              </a:spcBef>
-              <a:defRPr sz="2200"/>
+              <a:t>prefix parameters with: var, val or nothing</a:t>
+            </a:r>
+          </a:p>
+          <a:p>
+            <a:pPr lvl="2" marL="746759" indent="-248920" defTabSz="327152">
+              <a:spcBef>
+                <a:spcPts val="2300"/>
+              </a:spcBef>
+              <a:defRPr sz="1792"/>
             </a:pPr>
             <a:r>
-              <a:t>What if we want to inherit code from several types?</a:t>
-            </a:r>
-          </a:p>
-          <a:p>
-            <a:pPr marL="311150" indent="-311150" defTabSz="408940">
-              <a:spcBef>
-                <a:spcPts val="2900"/>
-              </a:spcBef>
-              <a:defRPr sz="2200"/>
+              <a:t>var - can be modified</a:t>
+            </a:r>
+          </a:p>
+          <a:p>
+            <a:pPr lvl="2" marL="746759" indent="-248920" defTabSz="327152">
+              <a:spcBef>
+                <a:spcPts val="2300"/>
+              </a:spcBef>
+              <a:defRPr sz="1792"/>
             </a:pPr>
             <a:r>
-              <a:t>Example: </a:t>
-            </a:r>
-          </a:p>
-          <a:p>
-            <a:pPr lvl="1" marL="622300" indent="-311150" defTabSz="408940">
-              <a:spcBef>
-                <a:spcPts val="2900"/>
-              </a:spcBef>
-              <a:defRPr sz="2200"/>
+              <a:t>val - is a value </a:t>
+            </a:r>
+          </a:p>
+          <a:p>
+            <a:pPr lvl="2" marL="746759" indent="-248920" defTabSz="327152">
+              <a:spcBef>
+                <a:spcPts val="2300"/>
+              </a:spcBef>
+              <a:defRPr sz="1792"/>
             </a:pPr>
             <a:r>
-              <a:t>Platypus is a mammal, but lays eggs</a:t>
-            </a:r>
-          </a:p>
-          <a:p>
-            <a:pPr lvl="1" marL="622300" indent="-311150" defTabSz="408940">
-              <a:spcBef>
-                <a:spcPts val="2900"/>
-              </a:spcBef>
-              <a:defRPr sz="2200"/>
+              <a:t>nothing - private values to the class</a:t>
+            </a:r>
+          </a:p>
+          <a:p>
+            <a:pPr lvl="1" marL="497840" indent="-248920" defTabSz="327152">
+              <a:spcBef>
+                <a:spcPts val="2300"/>
+              </a:spcBef>
+              <a:defRPr sz="1792"/>
             </a:pPr>
             <a:r>
-              <a:t>Credit card is an editable card, but should also have some security settings</a:t>
-            </a:r>
-          </a:p>
-        </p:txBody>
-      </p:sp>
-      <p:pic>
-        <p:nvPicPr>
-          <p:cNvPr id="212" name="Billede" descr="Billede"/>
-          <p:cNvPicPr>
-            <a:picLocks noChangeAspect="1"/>
-          </p:cNvPicPr>
-          <p:nvPr/>
-        </p:nvPicPr>
-        <p:blipFill>
-          <a:blip r:embed="rId2">
-            <a:extLst/>
-          </a:blip>
-          <a:stretch>
-            <a:fillRect/>
-          </a:stretch>
-        </p:blipFill>
+              <a:t>Defines at the same time parameters and fields of a class</a:t>
+            </a:r>
+          </a:p>
+          <a:p>
+            <a:pPr lvl="1" marL="497840" indent="-248920" defTabSz="327152">
+              <a:spcBef>
+                <a:spcPts val="2300"/>
+              </a:spcBef>
+              <a:defRPr sz="1792"/>
+            </a:pPr>
+            <a:r>
+              <a:t>Parameters without val or var are private values, visible only within the class</a:t>
+            </a:r>
+          </a:p>
+        </p:txBody>
+      </p:sp>
+      <p:sp>
+        <p:nvSpPr>
+          <p:cNvPr id="213" name="scala&gt;"/>
+          <p:cNvSpPr txBox="1"/>
+          <p:nvPr>
+            <p:ph type="body" idx="13"/>
+          </p:nvPr>
+        </p:nvSpPr>
         <p:spPr>
           <a:xfrm>
-            <a:off x="4952900" y="7266433"/>
-            <a:ext cx="2540001" cy="2540002"/>
+            <a:off x="150138" y="6502398"/>
+            <a:ext cx="12704524" cy="1563442"/>
           </a:xfrm>
           <a:prstGeom prst="rect">
             <a:avLst/>
           </a:prstGeom>
-          <a:ln w="12700">
-            <a:miter lim="400000"/>
-          </a:ln>
-        </p:spPr>
-      </p:pic>
+          <a:extLst>
+            <a:ext uri="{C572A759-6A51-4108-AA02-DFA0A04FC94B}">
+              <ma14:wrappingTextBoxFlag xmlns:ma14="http://schemas.microsoft.com/office/mac/drawingml/2011/main" val="1"/>
+            </a:ext>
+          </a:extLst>
+        </p:spPr>
+        <p:txBody>
+          <a:bodyPr/>
+          <a:lstStyle/>
+          <a:p>
+            <a:pPr marL="0" indent="0">
+              <a:spcBef>
+                <a:spcPts val="0"/>
+              </a:spcBef>
+              <a:buSzTx/>
+              <a:buNone/>
+              <a:defRPr sz="2400">
+                <a:solidFill>
+                  <a:srgbClr val="FFFFFF"/>
+                </a:solidFill>
+                <a:latin typeface="Andale Mono"/>
+                <a:ea typeface="Andale Mono"/>
+                <a:cs typeface="Andale Mono"/>
+                <a:sym typeface="Andale Mono"/>
+              </a:defRPr>
+            </a:pPr>
+            <a:r>
+              <a:t>class Point(val x: Int, val y: Int)</a:t>
+            </a:r>
+          </a:p>
+          <a:p>
+            <a:pPr marL="0" indent="0">
+              <a:spcBef>
+                <a:spcPts val="0"/>
+              </a:spcBef>
+              <a:buSzTx/>
+              <a:buNone/>
+              <a:defRPr sz="2400">
+                <a:solidFill>
+                  <a:srgbClr val="FFFFFF"/>
+                </a:solidFill>
+                <a:latin typeface="Andale Mono"/>
+                <a:ea typeface="Andale Mono"/>
+                <a:cs typeface="Andale Mono"/>
+                <a:sym typeface="Andale Mono"/>
+              </a:defRPr>
+            </a:pPr>
+            <a:r>
+              <a:t>val point = new Point(1, 2)</a:t>
+            </a:r>
+          </a:p>
+          <a:p>
+            <a:pPr marL="0" indent="0">
+              <a:spcBef>
+                <a:spcPts val="0"/>
+              </a:spcBef>
+              <a:buSzTx/>
+              <a:buNone/>
+              <a:defRPr sz="2400">
+                <a:solidFill>
+                  <a:srgbClr val="FFFFFF"/>
+                </a:solidFill>
+                <a:latin typeface="Andale Mono"/>
+                <a:ea typeface="Andale Mono"/>
+                <a:cs typeface="Andale Mono"/>
+                <a:sym typeface="Andale Mono"/>
+              </a:defRPr>
+            </a:pPr>
+            <a:r>
+              <a:t>println( point.x)</a:t>
+            </a:r>
+          </a:p>
+          <a:p>
+            <a:pPr marL="0" indent="0">
+              <a:spcBef>
+                <a:spcPts val="0"/>
+              </a:spcBef>
+              <a:buSzTx/>
+              <a:buNone/>
+              <a:defRPr sz="2400">
+                <a:solidFill>
+                  <a:srgbClr val="FFFFFF"/>
+                </a:solidFill>
+                <a:latin typeface="Andale Mono"/>
+                <a:ea typeface="Andale Mono"/>
+                <a:cs typeface="Andale Mono"/>
+                <a:sym typeface="Andale Mono"/>
+              </a:defRPr>
+            </a:pPr>
+            <a:r>
+              <a:t>point.x = 3  // &lt;-- does not compile</a:t>
+            </a:r>
+          </a:p>
+        </p:txBody>
+      </p:sp>
     </p:spTree>
   </p:cSld>
   <p:clrMapOvr>
@@ -4425,7 +4533,7 @@
       </p:grpSpPr>
       <p:sp>
         <p:nvSpPr>
-          <p:cNvPr id="214" name="Trait"/>
+          <p:cNvPr id="215" name="Trait"/>
           <p:cNvSpPr txBox="1"/>
           <p:nvPr>
             <p:ph type="title"/>
@@ -4453,16 +4561,16 @@
       </p:sp>
       <p:sp>
         <p:nvSpPr>
-          <p:cNvPr id="215" name="You can use traits, to inherit functionality from several places…"/>
-          <p:cNvSpPr txBox="1"/>
-          <p:nvPr>
-            <p:ph type="body" sz="half" idx="1"/>
+          <p:cNvPr id="216" name="You can use traits, to inherit functionality from several places…"/>
+          <p:cNvSpPr txBox="1"/>
+          <p:nvPr>
+            <p:ph type="body" idx="1"/>
           </p:nvPr>
         </p:nvSpPr>
         <p:spPr>
           <a:xfrm>
-            <a:off x="952499" y="2590800"/>
-            <a:ext cx="11519845" cy="2985246"/>
+            <a:off x="952499" y="1569491"/>
+            <a:ext cx="11519845" cy="4431558"/>
           </a:xfrm>
           <a:prstGeom prst="rect">
             <a:avLst/>
@@ -4472,33 +4580,44 @@
           <a:bodyPr/>
           <a:lstStyle/>
           <a:p>
-            <a:pPr marL="231139" indent="-231139" defTabSz="303783">
-              <a:spcBef>
-                <a:spcPts val="2100"/>
-              </a:spcBef>
-              <a:defRPr sz="1625"/>
+            <a:pPr marL="291591" indent="-291591" defTabSz="383234">
+              <a:spcBef>
+                <a:spcPts val="2700"/>
+              </a:spcBef>
+              <a:defRPr sz="2050"/>
             </a:pPr>
             <a:r>
               <a:t>You can use traits, to inherit functionality from several places</a:t>
             </a:r>
           </a:p>
           <a:p>
-            <a:pPr marL="231139" indent="-231139" defTabSz="303783">
-              <a:spcBef>
-                <a:spcPts val="2100"/>
-              </a:spcBef>
-              <a:defRPr sz="1625"/>
+            <a:pPr marL="291591" indent="-291591" defTabSz="383234">
+              <a:spcBef>
+                <a:spcPts val="2700"/>
+              </a:spcBef>
+              <a:defRPr sz="2050"/>
             </a:pPr>
             <a:r>
               <a:t>Classes, objects and traits can inherit from at most one class but arbitrary many traits</a:t>
             </a:r>
           </a:p>
           <a:p>
-            <a:pPr marL="231139" indent="-231139" defTabSz="303783">
-              <a:spcBef>
-                <a:spcPts val="2100"/>
-              </a:spcBef>
-              <a:defRPr sz="1625"/>
+            <a:pPr marL="291591" indent="-291591" defTabSz="383234">
+              <a:spcBef>
+                <a:spcPts val="2700"/>
+              </a:spcBef>
+              <a:defRPr sz="2050"/>
+            </a:pPr>
+            <a:r>
+              <a:t>Can’t have constructor parameters</a:t>
+            </a:r>
+          </a:p>
+          <a:p>
+            <a:pPr marL="291591" indent="-291591" defTabSz="383234">
+              <a:spcBef>
+                <a:spcPts val="2700"/>
+              </a:spcBef>
+              <a:defRPr sz="2050"/>
             </a:pPr>
             <a:r>
               <a:t>A trait is declared like an abstract class, just with </a:t>
@@ -4517,11 +4636,11 @@
             <a:endParaRPr b="1"/>
           </a:p>
           <a:p>
-            <a:pPr marL="231139" indent="-231139" defTabSz="303783">
-              <a:spcBef>
-                <a:spcPts val="2100"/>
-              </a:spcBef>
-              <a:defRPr sz="1625"/>
+            <a:pPr marL="291591" indent="-291591" defTabSz="383234">
+              <a:spcBef>
+                <a:spcPts val="2700"/>
+              </a:spcBef>
+              <a:defRPr sz="2050"/>
             </a:pPr>
             <a:r>
               <a:t>When a class extends a trait, it uses the </a:t>
@@ -4542,11 +4661,11 @@
             </a:r>
           </a:p>
           <a:p>
-            <a:pPr marL="231139" indent="-231139" defTabSz="303783">
-              <a:spcBef>
-                <a:spcPts val="2100"/>
-              </a:spcBef>
-              <a:defRPr sz="1625"/>
+            <a:pPr marL="291591" indent="-291591" defTabSz="383234">
+              <a:spcBef>
+                <a:spcPts val="2700"/>
+              </a:spcBef>
+              <a:defRPr sz="2050"/>
             </a:pPr>
             <a:r>
               <a:t>When extending one trait, use </a:t>
@@ -4558,11 +4677,11 @@
             <a:endParaRPr b="1"/>
           </a:p>
           <a:p>
-            <a:pPr marL="231139" indent="-231139" defTabSz="303783">
-              <a:spcBef>
-                <a:spcPts val="2100"/>
-              </a:spcBef>
-              <a:defRPr sz="1625"/>
+            <a:pPr marL="291591" indent="-291591" defTabSz="383234">
+              <a:spcBef>
+                <a:spcPts val="2700"/>
+              </a:spcBef>
+              <a:defRPr sz="2050"/>
             </a:pPr>
             <a:r>
               <a:t>When extending several traits, use </a:t>
@@ -4576,7 +4695,7 @@
       </p:sp>
       <p:sp>
         <p:nvSpPr>
-          <p:cNvPr id="216" name="trait Planar {…"/>
+          <p:cNvPr id="217" name="trait Planar {…"/>
           <p:cNvSpPr txBox="1"/>
           <p:nvPr>
             <p:ph type="body" idx="13"/>
@@ -4584,7 +4703,7 @@
         </p:nvSpPr>
         <p:spPr>
           <a:xfrm>
-            <a:off x="150138" y="5740398"/>
+            <a:off x="150138" y="6248398"/>
             <a:ext cx="12704524" cy="2844802"/>
           </a:xfrm>
           <a:prstGeom prst="rect">
@@ -4854,7 +4973,7 @@
       </p:grpSpPr>
       <p:sp>
         <p:nvSpPr>
-          <p:cNvPr id="218" name="Class vs trait"/>
+          <p:cNvPr id="219" name="Class vs trait"/>
           <p:cNvSpPr txBox="1"/>
           <p:nvPr>
             <p:ph type="title"/>
@@ -4878,7 +4997,7 @@
       </p:sp>
       <p:sp>
         <p:nvSpPr>
-          <p:cNvPr id="219" name="Traits resemble interfaces in Java, but are more powerful…"/>
+          <p:cNvPr id="220" name="Traits resemble interfaces in Java, but are more powerful…"/>
           <p:cNvSpPr txBox="1"/>
           <p:nvPr>
             <p:ph type="body" sz="half" idx="1"/>
@@ -4914,7 +5033,7 @@
       </p:sp>
       <p:sp>
         <p:nvSpPr>
-          <p:cNvPr id="220" name="scala&gt;"/>
+          <p:cNvPr id="221" name="scala&gt;"/>
           <p:cNvSpPr txBox="1"/>
           <p:nvPr>
             <p:ph type="body" idx="13"/>
@@ -4976,7 +5095,7 @@
       </p:grpSpPr>
       <p:sp>
         <p:nvSpPr>
-          <p:cNvPr id="222" name="What is the difference?"/>
+          <p:cNvPr id="223" name="What is the difference?"/>
           <p:cNvSpPr txBox="1"/>
           <p:nvPr>
             <p:ph type="title"/>
@@ -5000,7 +5119,7 @@
       </p:sp>
       <p:sp>
         <p:nvSpPr>
-          <p:cNvPr id="223" name="Abstract class vs Trait ???"/>
+          <p:cNvPr id="224" name="Abstract class vs Trait ???"/>
           <p:cNvSpPr txBox="1"/>
           <p:nvPr>
             <p:ph type="body" sz="half" idx="1"/>
@@ -5028,7 +5147,7 @@
       </p:sp>
       <p:pic>
         <p:nvPicPr>
-          <p:cNvPr id="224" name="Billede" descr="Billede"/>
+          <p:cNvPr id="225" name="Billede" descr="Billede"/>
           <p:cNvPicPr>
             <a:picLocks noChangeAspect="1"/>
           </p:cNvPicPr>
@@ -5083,7 +5202,7 @@
       </p:grpSpPr>
       <p:sp>
         <p:nvSpPr>
-          <p:cNvPr id="226" name="Scala Type Hierarchy"/>
+          <p:cNvPr id="227" name="Scala Type Hierarchy"/>
           <p:cNvSpPr txBox="1"/>
           <p:nvPr>
             <p:ph type="title"/>
@@ -5111,7 +5230,7 @@
       </p:sp>
       <p:pic>
         <p:nvPicPr>
-          <p:cNvPr id="227" name="Skærmbillede 2018-03-12 kl. 21.53.55.png" descr="Skærmbillede 2018-03-12 kl. 21.53.55.png"/>
+          <p:cNvPr id="228" name="Skærmbillede 2018-03-12 kl. 21.53.55.png" descr="Skærmbillede 2018-03-12 kl. 21.53.55.png"/>
           <p:cNvPicPr>
             <a:picLocks noChangeAspect="1"/>
           </p:cNvPicPr>
@@ -5166,7 +5285,7 @@
       </p:grpSpPr>
       <p:sp>
         <p:nvSpPr>
-          <p:cNvPr id="229" name="Top Types"/>
+          <p:cNvPr id="230" name="Top Types"/>
           <p:cNvSpPr txBox="1"/>
           <p:nvPr>
             <p:ph type="title"/>
@@ -5190,7 +5309,7 @@
       </p:sp>
       <p:sp>
         <p:nvSpPr>
-          <p:cNvPr id="230" name="In Scala, all values have a type, including numerical values and functions…"/>
+          <p:cNvPr id="231" name="In Scala, all values have a type, including numerical values and functions…"/>
           <p:cNvSpPr txBox="1"/>
           <p:nvPr>
             <p:ph type="body" sz="half" idx="1"/>
@@ -5289,7 +5408,7 @@
       </p:sp>
       <p:sp>
         <p:nvSpPr>
-          <p:cNvPr id="231" name="scala&gt;"/>
+          <p:cNvPr id="232" name="scala&gt;"/>
           <p:cNvSpPr txBox="1"/>
           <p:nvPr>
             <p:ph type="body" idx="13"/>
@@ -5528,7 +5647,7 @@
       </p:grpSpPr>
       <p:sp>
         <p:nvSpPr>
-          <p:cNvPr id="233" name="Bottom types"/>
+          <p:cNvPr id="234" name="Bottom types"/>
           <p:cNvSpPr txBox="1"/>
           <p:nvPr>
             <p:ph type="title"/>
@@ -5552,7 +5671,7 @@
       </p:sp>
       <p:sp>
         <p:nvSpPr>
-          <p:cNvPr id="234" name="Nothing is a subtype of all types, also called the bottom type. There is no value that has type Nothing…"/>
+          <p:cNvPr id="235" name="Nothing is a subtype of all types, also called the bottom type. There is no value that has type Nothing…"/>
           <p:cNvSpPr txBox="1"/>
           <p:nvPr>
             <p:ph type="body" idx="1"/>
@@ -5713,7 +5832,7 @@
       </p:grpSpPr>
       <p:sp>
         <p:nvSpPr>
-          <p:cNvPr id="236" name="Nothing is useful for Exception handling"/>
+          <p:cNvPr id="237" name="Nothing is useful for Exception handling"/>
           <p:cNvSpPr txBox="1"/>
           <p:nvPr>
             <p:ph type="title"/>
@@ -5741,7 +5860,7 @@
       </p:sp>
       <p:sp>
         <p:nvSpPr>
-          <p:cNvPr id="237" name="exception handling is similar to Java…"/>
+          <p:cNvPr id="238" name="exception handling is similar to Java…"/>
           <p:cNvSpPr txBox="1"/>
           <p:nvPr>
             <p:ph type="body" idx="1"/>
@@ -5795,7 +5914,7 @@
       </p:sp>
       <p:sp>
         <p:nvSpPr>
-          <p:cNvPr id="238" name="scala&gt;"/>
+          <p:cNvPr id="239" name="scala&gt;"/>
           <p:cNvSpPr txBox="1"/>
           <p:nvPr/>
         </p:nvSpPr>
@@ -5902,7 +6021,7 @@
       </p:grpSpPr>
       <p:sp>
         <p:nvSpPr>
-          <p:cNvPr id="170" name="Abstract classes"/>
+          <p:cNvPr id="171" name="Abstract classes"/>
           <p:cNvSpPr txBox="1"/>
           <p:nvPr>
             <p:ph type="title"/>
@@ -5926,13 +6045,17 @@
       </p:sp>
       <p:sp>
         <p:nvSpPr>
-          <p:cNvPr id="171" name="Can not be instantiated…"/>
-          <p:cNvSpPr txBox="1"/>
-          <p:nvPr>
-            <p:ph type="body" sz="half" idx="1"/>
-          </p:nvPr>
-        </p:nvSpPr>
-        <p:spPr>
+          <p:cNvPr id="172" name="Can not be instantiated!…"/>
+          <p:cNvSpPr txBox="1"/>
+          <p:nvPr>
+            <p:ph type="body" idx="1"/>
+          </p:nvPr>
+        </p:nvSpPr>
+        <p:spPr>
+          <a:xfrm>
+            <a:off x="952500" y="2590800"/>
+            <a:ext cx="11519843" cy="4834087"/>
+          </a:xfrm>
           <a:prstGeom prst="rect">
             <a:avLst/>
           </a:prstGeom>
@@ -5941,71 +6064,100 @@
           <a:bodyPr/>
           <a:lstStyle/>
           <a:p>
-            <a:pPr marL="284479" indent="-284479" defTabSz="373887">
-              <a:spcBef>
-                <a:spcPts val="2600"/>
-              </a:spcBef>
-              <a:defRPr sz="2048"/>
+            <a:pPr marL="368934" indent="-368934" defTabSz="484886">
+              <a:spcBef>
+                <a:spcPts val="3400"/>
+              </a:spcBef>
+              <a:defRPr sz="2656"/>
             </a:pPr>
             <a:r>
-              <a:t>Can not be instantiated</a:t>
-            </a:r>
-          </a:p>
-          <a:p>
-            <a:pPr marL="284479" indent="-284479" defTabSz="373887">
-              <a:spcBef>
-                <a:spcPts val="2600"/>
-              </a:spcBef>
-              <a:defRPr sz="2048"/>
+              <a:t>Can not be instantiated!</a:t>
+            </a:r>
+          </a:p>
+          <a:p>
+            <a:pPr marL="368934" indent="-368934" defTabSz="484886">
+              <a:spcBef>
+                <a:spcPts val="3400"/>
+              </a:spcBef>
+              <a:defRPr sz="2656"/>
             </a:pPr>
             <a:r>
-              <a:t>abstract, extends</a:t>
-            </a:r>
-          </a:p>
-          <a:p>
-            <a:pPr marL="284479" indent="-284479" defTabSz="373887">
-              <a:spcBef>
-                <a:spcPts val="2600"/>
-              </a:spcBef>
-              <a:defRPr sz="2048"/>
+              <a:t>Use </a:t>
+            </a:r>
+            <a:r>
+              <a:rPr b="1"/>
+              <a:t>abstract </a:t>
+            </a:r>
+            <a:r>
+              <a:t> keyword </a:t>
+            </a:r>
+          </a:p>
+          <a:p>
+            <a:pPr marL="368934" indent="-368934" defTabSz="484886">
+              <a:spcBef>
+                <a:spcPts val="3400"/>
+              </a:spcBef>
+              <a:defRPr sz="2656"/>
             </a:pPr>
             <a:r>
-              <a:t>subclass</a:t>
-            </a:r>
-          </a:p>
-          <a:p>
-            <a:pPr marL="284479" indent="-284479" defTabSz="373887">
-              <a:spcBef>
-                <a:spcPts val="2600"/>
-              </a:spcBef>
-              <a:defRPr sz="2048"/>
+              <a:t>Use </a:t>
+            </a:r>
+            <a:r>
+              <a:rPr b="1"/>
+              <a:t>extends</a:t>
+            </a:r>
+            <a:r>
+              <a:t> keyword to define a subclass</a:t>
+            </a:r>
+          </a:p>
+          <a:p>
+            <a:pPr marL="368934" indent="-368934" defTabSz="484886">
+              <a:spcBef>
+                <a:spcPts val="3400"/>
+              </a:spcBef>
+              <a:defRPr sz="2656"/>
             </a:pPr>
             <a:r>
-              <a:t>superclass - baseclass</a:t>
-            </a:r>
-          </a:p>
-          <a:p>
-            <a:pPr marL="284479" indent="-284479" defTabSz="373887">
-              <a:spcBef>
-                <a:spcPts val="2600"/>
-              </a:spcBef>
-              <a:defRPr sz="2048"/>
+              <a:t>The abstract class is a superclass of the realizations - baseclass</a:t>
+            </a:r>
+          </a:p>
+          <a:p>
+            <a:pPr marL="368934" indent="-368934" defTabSz="484886">
+              <a:spcBef>
+                <a:spcPts val="3400"/>
+              </a:spcBef>
+              <a:defRPr sz="2656"/>
             </a:pPr>
             <a:r>
-              <a:t>Object - root class of all Scala classes </a:t>
-            </a:r>
-          </a:p>
-        </p:txBody>
-      </p:sp>
-      <p:sp>
-        <p:nvSpPr>
-          <p:cNvPr id="172" name="scala&gt;"/>
+              <a:t>Can have undefined methods</a:t>
+            </a:r>
+          </a:p>
+          <a:p>
+            <a:pPr marL="368934" indent="-368934" defTabSz="484886">
+              <a:spcBef>
+                <a:spcPts val="3400"/>
+              </a:spcBef>
+              <a:defRPr sz="2656"/>
+            </a:pPr>
+            <a:r>
+              <a:t>The implementing class has to add method implementations</a:t>
+            </a:r>
+          </a:p>
+        </p:txBody>
+      </p:sp>
+      <p:sp>
+        <p:nvSpPr>
+          <p:cNvPr id="173" name="abstract class Animal(name: String)"/>
           <p:cNvSpPr txBox="1"/>
           <p:nvPr>
             <p:ph type="body" idx="13"/>
           </p:nvPr>
         </p:nvSpPr>
         <p:spPr>
+          <a:xfrm>
+            <a:off x="150139" y="8013699"/>
+            <a:ext cx="12704522" cy="787401"/>
+          </a:xfrm>
           <a:prstGeom prst="rect">
             <a:avLst/>
           </a:prstGeom>
@@ -6016,7 +6168,7 @@
           <a:p>
             <a:pPr/>
             <a:r>
-              <a:t>scala&gt;</a:t>
+              <a:t>abstract class Animal(name: String)</a:t>
             </a:r>
           </a:p>
         </p:txBody>
@@ -6049,10 +6201,10 @@
       </p:grpSpPr>
       <p:sp>
         <p:nvSpPr>
-          <p:cNvPr id="240" name="Demo time!"/>
-          <p:cNvSpPr txBox="1"/>
-          <p:nvPr>
-            <p:ph type="title"/>
+          <p:cNvPr id="241" name="Demo time!"/>
+          <p:cNvSpPr txBox="1"/>
+          <p:nvPr>
+            <p:ph type="ctrTitle"/>
           </p:nvPr>
         </p:nvSpPr>
         <p:spPr>
@@ -6073,10 +6225,10 @@
       </p:sp>
       <p:sp>
         <p:nvSpPr>
-          <p:cNvPr id="241" name="Let’s have a look at the types"/>
-          <p:cNvSpPr txBox="1"/>
-          <p:nvPr>
-            <p:ph type="body" sz="half" idx="1"/>
+          <p:cNvPr id="242" name="Let’s have a look at the types"/>
+          <p:cNvSpPr txBox="1"/>
+          <p:nvPr>
+            <p:ph type="subTitle" sz="quarter" idx="1"/>
           </p:nvPr>
         </p:nvSpPr>
         <p:spPr>
@@ -6091,30 +6243,6 @@
             <a:pPr/>
             <a:r>
               <a:t>Let’s have a look at the types</a:t>
-            </a:r>
-          </a:p>
-        </p:txBody>
-      </p:sp>
-      <p:sp>
-        <p:nvSpPr>
-          <p:cNvPr id="242" name="class_hierarchies.scalaTypes"/>
-          <p:cNvSpPr txBox="1"/>
-          <p:nvPr>
-            <p:ph type="body" idx="13"/>
-          </p:nvPr>
-        </p:nvSpPr>
-        <p:spPr>
-          <a:prstGeom prst="rect">
-            <a:avLst/>
-          </a:prstGeom>
-        </p:spPr>
-        <p:txBody>
-          <a:bodyPr/>
-          <a:lstStyle/>
-          <a:p>
-            <a:pPr/>
-            <a:r>
-              <a:t>class_hierarchies.scalaTypes</a:t>
             </a:r>
           </a:p>
         </p:txBody>
@@ -6147,10 +6275,10 @@
       </p:grpSpPr>
       <p:sp>
         <p:nvSpPr>
-          <p:cNvPr id="244" name="Class parameters"/>
-          <p:cNvSpPr txBox="1"/>
-          <p:nvPr>
-            <p:ph type="title"/>
+          <p:cNvPr id="244" name="Lab time!"/>
+          <p:cNvSpPr txBox="1"/>
+          <p:nvPr>
+            <p:ph type="ctrTitle"/>
           </p:nvPr>
         </p:nvSpPr>
         <p:spPr>
@@ -6164,24 +6292,20 @@
           <a:p>
             <a:pPr/>
             <a:r>
-              <a:t>Class parameters</a:t>
-            </a:r>
-          </a:p>
-        </p:txBody>
-      </p:sp>
-      <p:sp>
-        <p:nvSpPr>
-          <p:cNvPr id="245" name="You can define a class with parameters (primary constructor)…"/>
-          <p:cNvSpPr txBox="1"/>
-          <p:nvPr>
-            <p:ph type="body" idx="1"/>
-          </p:nvPr>
-        </p:nvSpPr>
-        <p:spPr>
-          <a:xfrm>
-            <a:off x="520700" y="1651000"/>
-            <a:ext cx="11519844" cy="4449516"/>
-          </a:xfrm>
+              <a:t>Lab time!</a:t>
+            </a:r>
+          </a:p>
+        </p:txBody>
+      </p:sp>
+      <p:sp>
+        <p:nvSpPr>
+          <p:cNvPr id="245" name="class_hierarchies_06"/>
+          <p:cNvSpPr txBox="1"/>
+          <p:nvPr>
+            <p:ph type="subTitle" sz="quarter" idx="1"/>
+          </p:nvPr>
+        </p:nvSpPr>
+        <p:spPr>
           <a:prstGeom prst="rect">
             <a:avLst/>
           </a:prstGeom>
@@ -6190,402 +6314,42 @@
           <a:bodyPr/>
           <a:lstStyle/>
           <a:p>
-            <a:pPr lvl="1" marL="497840" indent="-248920" defTabSz="327152">
-              <a:spcBef>
-                <a:spcPts val="2300"/>
-              </a:spcBef>
-              <a:defRPr sz="1792"/>
-            </a:pPr>
-            <a:r>
-              <a:t>You can define a class with parameters (primary constructor)</a:t>
-            </a:r>
-          </a:p>
-          <a:p>
-            <a:pPr lvl="1" marL="497840" indent="-248920" defTabSz="327152">
-              <a:spcBef>
-                <a:spcPts val="2300"/>
-              </a:spcBef>
-              <a:defRPr sz="1792"/>
-            </a:pPr>
-            <a:r>
-              <a:t>Primary constructor parameters with val and var are public</a:t>
-            </a:r>
-          </a:p>
-          <a:p>
-            <a:pPr lvl="1" marL="497840" indent="-248920" defTabSz="327152">
-              <a:spcBef>
-                <a:spcPts val="2300"/>
-              </a:spcBef>
-              <a:defRPr sz="1792"/>
-            </a:pPr>
-            <a:r>
-              <a:t>prefix parameters with: var, val or nothing</a:t>
-            </a:r>
-          </a:p>
-          <a:p>
-            <a:pPr lvl="2" marL="746759" indent="-248920" defTabSz="327152">
-              <a:spcBef>
-                <a:spcPts val="2300"/>
-              </a:spcBef>
-              <a:defRPr sz="1792"/>
-            </a:pPr>
-            <a:r>
-              <a:t>var - can be modified</a:t>
-            </a:r>
-          </a:p>
-          <a:p>
-            <a:pPr lvl="2" marL="746759" indent="-248920" defTabSz="327152">
-              <a:spcBef>
-                <a:spcPts val="2300"/>
-              </a:spcBef>
-              <a:defRPr sz="1792"/>
-            </a:pPr>
-            <a:r>
-              <a:t>val - is a value </a:t>
-            </a:r>
-          </a:p>
-          <a:p>
-            <a:pPr lvl="2" marL="746759" indent="-248920" defTabSz="327152">
-              <a:spcBef>
-                <a:spcPts val="2300"/>
-              </a:spcBef>
-              <a:defRPr sz="1792"/>
-            </a:pPr>
-            <a:r>
-              <a:t>nothing - private values to the class</a:t>
-            </a:r>
-          </a:p>
-          <a:p>
-            <a:pPr lvl="1" marL="497840" indent="-248920" defTabSz="327152">
-              <a:spcBef>
-                <a:spcPts val="2300"/>
-              </a:spcBef>
-              <a:defRPr sz="1792"/>
-            </a:pPr>
-            <a:r>
-              <a:t>Defines at the same time parameters and fields of a class</a:t>
-            </a:r>
-          </a:p>
-          <a:p>
-            <a:pPr lvl="1" marL="497840" indent="-248920" defTabSz="327152">
-              <a:spcBef>
-                <a:spcPts val="2300"/>
-              </a:spcBef>
-              <a:defRPr sz="1792"/>
-            </a:pPr>
-            <a:r>
-              <a:t>Parameters without val or var are private values, visible only within the class</a:t>
-            </a:r>
-          </a:p>
-        </p:txBody>
-      </p:sp>
-      <p:sp>
-        <p:nvSpPr>
-          <p:cNvPr id="246" name="scala&gt;"/>
-          <p:cNvSpPr txBox="1"/>
-          <p:nvPr>
-            <p:ph type="body" idx="13"/>
-          </p:nvPr>
-        </p:nvSpPr>
+            <a:pPr/>
+            <a:r>
+              <a:t>class_hierarchies_06</a:t>
+            </a:r>
+          </a:p>
+        </p:txBody>
+      </p:sp>
+      <p:pic>
+        <p:nvPicPr>
+          <p:cNvPr id="246" name="Billede" descr="Billede"/>
+          <p:cNvPicPr>
+            <a:picLocks noChangeAspect="1"/>
+          </p:cNvPicPr>
+          <p:nvPr/>
+        </p:nvPicPr>
+        <p:blipFill>
+          <a:blip r:embed="rId2">
+            <a:extLst/>
+          </a:blip>
+          <a:stretch>
+            <a:fillRect/>
+          </a:stretch>
+        </p:blipFill>
         <p:spPr>
           <a:xfrm>
-            <a:off x="150138" y="6502398"/>
-            <a:ext cx="12704524" cy="1563442"/>
+            <a:off x="8833739" y="5778500"/>
+            <a:ext cx="3783364" cy="3449166"/>
           </a:xfrm>
           <a:prstGeom prst="rect">
             <a:avLst/>
           </a:prstGeom>
-          <a:extLst>
-            <a:ext uri="{C572A759-6A51-4108-AA02-DFA0A04FC94B}">
-              <ma14:wrappingTextBoxFlag xmlns:ma14="http://schemas.microsoft.com/office/mac/drawingml/2011/main" val="1"/>
-            </a:ext>
-          </a:extLst>
-        </p:spPr>
-        <p:txBody>
-          <a:bodyPr/>
-          <a:lstStyle/>
-          <a:p>
-            <a:pPr marL="0" indent="0">
-              <a:spcBef>
-                <a:spcPts val="0"/>
-              </a:spcBef>
-              <a:buSzTx/>
-              <a:buNone/>
-              <a:defRPr sz="2400">
-                <a:solidFill>
-                  <a:srgbClr val="FFFFFF"/>
-                </a:solidFill>
-                <a:latin typeface="Andale Mono"/>
-                <a:ea typeface="Andale Mono"/>
-                <a:cs typeface="Andale Mono"/>
-                <a:sym typeface="Andale Mono"/>
-              </a:defRPr>
-            </a:pPr>
-            <a:r>
-              <a:t>class Point(val x: Int, val y: Int)</a:t>
-            </a:r>
-          </a:p>
-          <a:p>
-            <a:pPr marL="0" indent="0">
-              <a:spcBef>
-                <a:spcPts val="0"/>
-              </a:spcBef>
-              <a:buSzTx/>
-              <a:buNone/>
-              <a:defRPr sz="2400">
-                <a:solidFill>
-                  <a:srgbClr val="FFFFFF"/>
-                </a:solidFill>
-                <a:latin typeface="Andale Mono"/>
-                <a:ea typeface="Andale Mono"/>
-                <a:cs typeface="Andale Mono"/>
-                <a:sym typeface="Andale Mono"/>
-              </a:defRPr>
-            </a:pPr>
-            <a:r>
-              <a:t>val point = new Point(1, 2)</a:t>
-            </a:r>
-          </a:p>
-          <a:p>
-            <a:pPr marL="0" indent="0">
-              <a:spcBef>
-                <a:spcPts val="0"/>
-              </a:spcBef>
-              <a:buSzTx/>
-              <a:buNone/>
-              <a:defRPr sz="2400">
-                <a:solidFill>
-                  <a:srgbClr val="FFFFFF"/>
-                </a:solidFill>
-                <a:latin typeface="Andale Mono"/>
-                <a:ea typeface="Andale Mono"/>
-                <a:cs typeface="Andale Mono"/>
-                <a:sym typeface="Andale Mono"/>
-              </a:defRPr>
-            </a:pPr>
-            <a:r>
-              <a:t>println( point.x)</a:t>
-            </a:r>
-          </a:p>
-          <a:p>
-            <a:pPr marL="0" indent="0">
-              <a:spcBef>
-                <a:spcPts val="0"/>
-              </a:spcBef>
-              <a:buSzTx/>
-              <a:buNone/>
-              <a:defRPr sz="2400">
-                <a:solidFill>
-                  <a:srgbClr val="FFFFFF"/>
-                </a:solidFill>
-                <a:latin typeface="Andale Mono"/>
-                <a:ea typeface="Andale Mono"/>
-                <a:cs typeface="Andale Mono"/>
-                <a:sym typeface="Andale Mono"/>
-              </a:defRPr>
-            </a:pPr>
-            <a:r>
-              <a:t>point.x = 3  // &lt;-- does not compile</a:t>
-            </a:r>
-          </a:p>
-        </p:txBody>
-      </p:sp>
-    </p:spTree>
-  </p:cSld>
-  <p:clrMapOvr>
-    <a:masterClrMapping/>
-  </p:clrMapOvr>
-  <p:transition xmlns:p14="http://schemas.microsoft.com/office/powerpoint/2010/main" spd="med" advClick="1"/>
-</p:sld>
-</file>
-
-<file path=ppt/slides/slide22.xml><?xml version="1.0" encoding="utf-8"?>
-<p:sld xmlns:a="http://schemas.openxmlformats.org/drawingml/2006/main" xmlns:r="http://schemas.openxmlformats.org/officeDocument/2006/relationships" xmlns:p="http://schemas.openxmlformats.org/presentationml/2006/main" showMasterSp="1" showMasterPhAnim="1">
-  <p:cSld>
-    <p:spTree>
-      <p:nvGrpSpPr>
-        <p:cNvPr id="1" name=""/>
-        <p:cNvGrpSpPr/>
-        <p:nvPr/>
-      </p:nvGrpSpPr>
-      <p:grpSpPr>
-        <a:xfrm>
-          <a:off x="0" y="0"/>
-          <a:ext cx="0" cy="0"/>
-          <a:chOff x="0" y="0"/>
-          <a:chExt cx="0" cy="0"/>
-        </a:xfrm>
-      </p:grpSpPr>
-      <p:sp>
-        <p:nvSpPr>
-          <p:cNvPr id="248" name="Demo time!"/>
-          <p:cNvSpPr txBox="1"/>
-          <p:nvPr>
-            <p:ph type="title"/>
-          </p:nvPr>
-        </p:nvSpPr>
-        <p:spPr>
-          <a:prstGeom prst="rect">
-            <a:avLst/>
-          </a:prstGeom>
-        </p:spPr>
-        <p:txBody>
-          <a:bodyPr/>
-          <a:lstStyle/>
-          <a:p>
-            <a:pPr/>
-            <a:r>
-              <a:t>Demo time!</a:t>
-            </a:r>
-          </a:p>
-        </p:txBody>
-      </p:sp>
-      <p:sp>
-        <p:nvSpPr>
-          <p:cNvPr id="249" name="IntSet - trait and class parameters"/>
-          <p:cNvSpPr txBox="1"/>
-          <p:nvPr>
-            <p:ph type="body" sz="half" idx="1"/>
-          </p:nvPr>
-        </p:nvSpPr>
-        <p:spPr>
-          <a:prstGeom prst="rect">
-            <a:avLst/>
-          </a:prstGeom>
-        </p:spPr>
-        <p:txBody>
-          <a:bodyPr/>
-          <a:lstStyle/>
-          <a:p>
-            <a:pPr/>
-            <a:r>
-              <a:t>IntSet - trait and class parameters</a:t>
-            </a:r>
-          </a:p>
-        </p:txBody>
-      </p:sp>
-      <p:sp>
-        <p:nvSpPr>
-          <p:cNvPr id="250" name="class_hierarchies.scala_hierarchies"/>
-          <p:cNvSpPr txBox="1"/>
-          <p:nvPr>
-            <p:ph type="body" idx="13"/>
-          </p:nvPr>
-        </p:nvSpPr>
-        <p:spPr>
-          <a:prstGeom prst="rect">
-            <a:avLst/>
-          </a:prstGeom>
-        </p:spPr>
-        <p:txBody>
-          <a:bodyPr/>
-          <a:lstStyle/>
-          <a:p>
-            <a:pPr/>
-            <a:r>
-              <a:t>class_hierarchies.scala_hierarchies</a:t>
-            </a:r>
-          </a:p>
-        </p:txBody>
-      </p:sp>
-    </p:spTree>
-  </p:cSld>
-  <p:clrMapOvr>
-    <a:masterClrMapping/>
-  </p:clrMapOvr>
-  <p:transition xmlns:p14="http://schemas.microsoft.com/office/powerpoint/2010/main" spd="med" advClick="1"/>
-</p:sld>
-</file>
-
-<file path=ppt/slides/slide23.xml><?xml version="1.0" encoding="utf-8"?>
-<p:sld xmlns:a="http://schemas.openxmlformats.org/drawingml/2006/main" xmlns:r="http://schemas.openxmlformats.org/officeDocument/2006/relationships" xmlns:p="http://schemas.openxmlformats.org/presentationml/2006/main" showMasterSp="1" showMasterPhAnim="1">
-  <p:cSld>
-    <p:spTree>
-      <p:nvGrpSpPr>
-        <p:cNvPr id="1" name=""/>
-        <p:cNvGrpSpPr/>
-        <p:nvPr/>
-      </p:nvGrpSpPr>
-      <p:grpSpPr>
-        <a:xfrm>
-          <a:off x="0" y="0"/>
-          <a:ext cx="0" cy="0"/>
-          <a:chOff x="0" y="0"/>
-          <a:chExt cx="0" cy="0"/>
-        </a:xfrm>
-      </p:grpSpPr>
-      <p:sp>
-        <p:nvSpPr>
-          <p:cNvPr id="252" name="Lab time!"/>
-          <p:cNvSpPr txBox="1"/>
-          <p:nvPr>
-            <p:ph type="title"/>
-          </p:nvPr>
-        </p:nvSpPr>
-        <p:spPr>
-          <a:prstGeom prst="rect">
-            <a:avLst/>
-          </a:prstGeom>
-        </p:spPr>
-        <p:txBody>
-          <a:bodyPr/>
-          <a:lstStyle/>
-          <a:p>
-            <a:pPr/>
-            <a:r>
-              <a:t>Lab time!</a:t>
-            </a:r>
-          </a:p>
-        </p:txBody>
-      </p:sp>
-      <p:sp>
-        <p:nvSpPr>
-          <p:cNvPr id="253" name="Build a small zoo"/>
-          <p:cNvSpPr txBox="1"/>
-          <p:nvPr>
-            <p:ph type="body" sz="half" idx="1"/>
-          </p:nvPr>
-        </p:nvSpPr>
-        <p:spPr>
-          <a:prstGeom prst="rect">
-            <a:avLst/>
-          </a:prstGeom>
-        </p:spPr>
-        <p:txBody>
-          <a:bodyPr/>
-          <a:lstStyle/>
-          <a:p>
-            <a:pPr/>
-            <a:r>
-              <a:t>Build a small zoo</a:t>
-            </a:r>
-          </a:p>
-        </p:txBody>
-      </p:sp>
-      <p:sp>
-        <p:nvSpPr>
-          <p:cNvPr id="254" name="class_hierarchies.lab"/>
-          <p:cNvSpPr txBox="1"/>
-          <p:nvPr>
-            <p:ph type="body" idx="13"/>
-          </p:nvPr>
-        </p:nvSpPr>
-        <p:spPr>
-          <a:prstGeom prst="rect">
-            <a:avLst/>
-          </a:prstGeom>
-        </p:spPr>
-        <p:txBody>
-          <a:bodyPr/>
-          <a:lstStyle/>
-          <a:p>
-            <a:pPr/>
-            <a:r>
-              <a:t>class_hierarchies.lab</a:t>
-            </a:r>
-          </a:p>
-        </p:txBody>
-      </p:sp>
+          <a:ln w="12700">
+            <a:miter lim="400000"/>
+          </a:ln>
+        </p:spPr>
+      </p:pic>
     </p:spTree>
   </p:cSld>
   <p:clrMapOvr>
@@ -6614,7 +6378,7 @@
       </p:grpSpPr>
       <p:sp>
         <p:nvSpPr>
-          <p:cNvPr id="174" name="Implementation"/>
+          <p:cNvPr id="175" name="Dynamic binding"/>
           <p:cNvSpPr txBox="1"/>
           <p:nvPr>
             <p:ph type="title"/>
@@ -6631,14 +6395,14 @@
           <a:p>
             <a:pPr/>
             <a:r>
-              <a:t>Implementation</a:t>
-            </a:r>
-          </a:p>
-        </p:txBody>
-      </p:sp>
-      <p:sp>
-        <p:nvSpPr>
-          <p:cNvPr id="175" name="Brødtekst"/>
+              <a:t>Dynamic binding</a:t>
+            </a:r>
+          </a:p>
+        </p:txBody>
+      </p:sp>
+      <p:sp>
+        <p:nvSpPr>
+          <p:cNvPr id="176" name="Dynamic method dispatch - which code will be called?…"/>
           <p:cNvSpPr txBox="1"/>
           <p:nvPr>
             <p:ph type="body" sz="half" idx="1"/>
@@ -6654,18 +6418,31 @@
           <a:lstStyle/>
           <a:p>
             <a:pPr/>
-          </a:p>
-        </p:txBody>
-      </p:sp>
-      <p:sp>
-        <p:nvSpPr>
-          <p:cNvPr id="176" name="scala&gt;"/>
+            <a:r>
+              <a:t>Dynamic method dispatch - which code will be called?</a:t>
+            </a:r>
+          </a:p>
+          <a:p>
+            <a:pPr/>
+            <a:r>
+              <a:t>In object oriented languages, the code invoked by method call depends on the runtime type of the object</a:t>
+            </a:r>
+          </a:p>
+        </p:txBody>
+      </p:sp>
+      <p:sp>
+        <p:nvSpPr>
+          <p:cNvPr id="177" name="empty contains 1"/>
           <p:cNvSpPr txBox="1"/>
           <p:nvPr>
             <p:ph type="body" idx="13"/>
           </p:nvPr>
         </p:nvSpPr>
         <p:spPr>
+          <a:xfrm>
+            <a:off x="150139" y="6673850"/>
+            <a:ext cx="12704522" cy="444501"/>
+          </a:xfrm>
           <a:prstGeom prst="rect">
             <a:avLst/>
           </a:prstGeom>
@@ -6676,7 +6453,7 @@
           <a:p>
             <a:pPr/>
             <a:r>
-              <a:t>scala&gt;</a:t>
+              <a:t>  empty contains 1 </a:t>
             </a:r>
           </a:p>
         </p:txBody>
@@ -6709,7 +6486,7 @@
       </p:grpSpPr>
       <p:sp>
         <p:nvSpPr>
-          <p:cNvPr id="178" name="Overriding"/>
+          <p:cNvPr id="179" name="Overriding"/>
           <p:cNvSpPr txBox="1"/>
           <p:nvPr>
             <p:ph type="title"/>
@@ -6733,7 +6510,7 @@
       </p:sp>
       <p:sp>
         <p:nvSpPr>
-          <p:cNvPr id="179" name="Redefine functionality…"/>
+          <p:cNvPr id="180" name="Redefine functionality…"/>
           <p:cNvSpPr txBox="1"/>
           <p:nvPr>
             <p:ph type="body" sz="half" idx="1"/>
@@ -6756,20 +6533,31 @@
           <a:p>
             <a:pPr/>
             <a:r>
-              <a:t>keyword override</a:t>
-            </a:r>
-          </a:p>
-          <a:p>
-            <a:pPr/>
-            <a:r>
-              <a:t>override is mandatory</a:t>
-            </a:r>
-          </a:p>
-        </p:txBody>
-      </p:sp>
-      <p:sp>
-        <p:nvSpPr>
-          <p:cNvPr id="180" name="override def toString() = &quot;.&quot;"/>
+              <a:t>Use the keyword </a:t>
+            </a:r>
+            <a:r>
+              <a:rPr b="1"/>
+              <a:t>override</a:t>
+            </a:r>
+          </a:p>
+          <a:p>
+            <a:pPr/>
+            <a:r>
+              <a:t>In Scala, </a:t>
+            </a:r>
+            <a:r>
+              <a:rPr b="1"/>
+              <a:t>override</a:t>
+            </a:r>
+            <a:r>
+              <a:t> is mandatory</a:t>
+            </a:r>
+          </a:p>
+        </p:txBody>
+      </p:sp>
+      <p:sp>
+        <p:nvSpPr>
+          <p:cNvPr id="181" name="override def toString() = &quot;.&quot;"/>
           <p:cNvSpPr txBox="1"/>
           <p:nvPr>
             <p:ph type="body" idx="13"/>
@@ -6823,7 +6611,7 @@
       </p:grpSpPr>
       <p:sp>
         <p:nvSpPr>
-          <p:cNvPr id="182" name="Object definition"/>
+          <p:cNvPr id="183" name="Object definition"/>
           <p:cNvSpPr txBox="1"/>
           <p:nvPr>
             <p:ph type="title"/>
@@ -6847,7 +6635,7 @@
       </p:sp>
       <p:sp>
         <p:nvSpPr>
-          <p:cNvPr id="183" name="Represents a singleton…"/>
+          <p:cNvPr id="184" name="Represents a singleton…"/>
           <p:cNvSpPr txBox="1"/>
           <p:nvPr>
             <p:ph type="body" sz="half" idx="1"/>
@@ -6924,7 +6712,7 @@
       </p:sp>
       <p:sp>
         <p:nvSpPr>
-          <p:cNvPr id="184" name="object Empty extends IntSet {…"/>
+          <p:cNvPr id="185" name="object Empty extends IntSet {…"/>
           <p:cNvSpPr txBox="1"/>
           <p:nvPr>
             <p:ph type="body" idx="13"/>
@@ -7005,7 +6793,7 @@
       </p:grpSpPr>
       <p:sp>
         <p:nvSpPr>
-          <p:cNvPr id="186" name="Persistent data structures"/>
+          <p:cNvPr id="187" name="Persistent data structures"/>
           <p:cNvSpPr txBox="1"/>
           <p:nvPr>
             <p:ph type="title"/>
@@ -7033,7 +6821,7 @@
       </p:sp>
       <p:sp>
         <p:nvSpPr>
-          <p:cNvPr id="187" name="On change, the old structure still exists"/>
+          <p:cNvPr id="188" name="On change, the old structure still exists"/>
           <p:cNvSpPr txBox="1"/>
           <p:nvPr>
             <p:ph type="body" sz="half" idx="1"/>
@@ -7057,7 +6845,7 @@
       </p:sp>
       <p:pic>
         <p:nvPicPr>
-          <p:cNvPr id="188" name="Billede" descr="Billede"/>
+          <p:cNvPr id="189" name="Billede" descr="Billede"/>
           <p:cNvPicPr>
             <a:picLocks noChangeAspect="1"/>
           </p:cNvPicPr>
@@ -7112,13 +6900,49 @@
       </p:grpSpPr>
       <p:sp>
         <p:nvSpPr>
-          <p:cNvPr id="190" name="Dynamic binding"/>
+          <p:cNvPr id="191" name="What about multiple inheritance?"/>
           <p:cNvSpPr txBox="1"/>
           <p:nvPr>
             <p:ph type="title"/>
           </p:nvPr>
         </p:nvSpPr>
         <p:spPr>
+          <a:xfrm>
+            <a:off x="952500" y="253999"/>
+            <a:ext cx="11099800" cy="1360738"/>
+          </a:xfrm>
+          <a:prstGeom prst="rect">
+            <a:avLst/>
+          </a:prstGeom>
+        </p:spPr>
+        <p:txBody>
+          <a:bodyPr/>
+          <a:lstStyle>
+            <a:lvl1pPr defTabSz="414780">
+              <a:defRPr sz="5600"/>
+            </a:lvl1pPr>
+          </a:lstStyle>
+          <a:p>
+            <a:pPr/>
+            <a:r>
+              <a:t>What about multiple inheritance?</a:t>
+            </a:r>
+          </a:p>
+        </p:txBody>
+      </p:sp>
+      <p:sp>
+        <p:nvSpPr>
+          <p:cNvPr id="192" name="We can build large class hierachies…"/>
+          <p:cNvSpPr txBox="1"/>
+          <p:nvPr>
+            <p:ph type="body" idx="1"/>
+          </p:nvPr>
+        </p:nvSpPr>
+        <p:spPr>
+          <a:xfrm>
+            <a:off x="952499" y="2197100"/>
+            <a:ext cx="11415416" cy="4855270"/>
+          </a:xfrm>
           <a:prstGeom prst="rect">
             <a:avLst/>
           </a:prstGeom>
@@ -7127,71 +6951,120 @@
           <a:bodyPr/>
           <a:lstStyle/>
           <a:p>
-            <a:pPr/>
-            <a:r>
-              <a:t>Dynamic binding</a:t>
-            </a:r>
-          </a:p>
-        </p:txBody>
-      </p:sp>
-      <p:sp>
-        <p:nvSpPr>
-          <p:cNvPr id="191" name="Dynamic method dispatch - which code will be called?…"/>
-          <p:cNvSpPr txBox="1"/>
-          <p:nvPr>
-            <p:ph type="body" sz="half" idx="1"/>
-          </p:nvPr>
-        </p:nvSpPr>
-        <p:spPr>
-          <a:prstGeom prst="rect">
-            <a:avLst/>
-          </a:prstGeom>
-        </p:spPr>
-        <p:txBody>
-          <a:bodyPr/>
-          <a:lstStyle/>
-          <a:p>
-            <a:pPr/>
-            <a:r>
-              <a:t>Dynamic method dispatch - which code will be called?</a:t>
-            </a:r>
-          </a:p>
-          <a:p>
-            <a:pPr/>
-            <a:r>
-              <a:t>In object oriented languages, the code invoked by method call depends on the runtime type of the object</a:t>
-            </a:r>
-          </a:p>
-        </p:txBody>
-      </p:sp>
-      <p:sp>
-        <p:nvSpPr>
-          <p:cNvPr id="192" name="empty contains 1"/>
-          <p:cNvSpPr txBox="1"/>
-          <p:nvPr>
-            <p:ph type="body" idx="13"/>
-          </p:nvPr>
-        </p:nvSpPr>
+            <a:pPr marL="311150" indent="-311150" defTabSz="408940">
+              <a:spcBef>
+                <a:spcPts val="2900"/>
+              </a:spcBef>
+              <a:defRPr sz="2200"/>
+            </a:pPr>
+            <a:r>
+              <a:t>We can build large class hierachies</a:t>
+            </a:r>
+          </a:p>
+          <a:p>
+            <a:pPr marL="311150" indent="-311150" defTabSz="408940">
+              <a:spcBef>
+                <a:spcPts val="2900"/>
+              </a:spcBef>
+              <a:defRPr sz="2200"/>
+            </a:pPr>
+            <a:r>
+              <a:t>Scala is a single inheritance language - </a:t>
+            </a:r>
+            <a:r>
+              <a:t>a class can only have </a:t>
+            </a:r>
+            <a:r>
+              <a:rPr b="1"/>
+              <a:t>one superclass</a:t>
+            </a:r>
+          </a:p>
+          <a:p>
+            <a:pPr marL="311150" indent="-311150" defTabSz="408940">
+              <a:spcBef>
+                <a:spcPts val="2900"/>
+              </a:spcBef>
+              <a:defRPr sz="2200"/>
+            </a:pPr>
+            <a:r>
+              <a:t>What if a class has several natural supertypes?</a:t>
+            </a:r>
+          </a:p>
+          <a:p>
+            <a:pPr marL="311150" indent="-311150" defTabSz="408940">
+              <a:spcBef>
+                <a:spcPts val="2900"/>
+              </a:spcBef>
+              <a:defRPr sz="2200"/>
+            </a:pPr>
+            <a:r>
+              <a:t>What if we want to inherit code from several types?</a:t>
+            </a:r>
+          </a:p>
+          <a:p>
+            <a:pPr marL="311150" indent="-311150" defTabSz="408940">
+              <a:spcBef>
+                <a:spcPts val="2900"/>
+              </a:spcBef>
+              <a:defRPr sz="2200"/>
+            </a:pPr>
+            <a:r>
+              <a:t>Example: </a:t>
+            </a:r>
+          </a:p>
+          <a:p>
+            <a:pPr lvl="1" marL="622300" indent="-311150" defTabSz="408940">
+              <a:spcBef>
+                <a:spcPts val="2900"/>
+              </a:spcBef>
+              <a:defRPr sz="2200"/>
+            </a:pPr>
+            <a:r>
+              <a:t>Platypus is a mammal, but lays eggs</a:t>
+            </a:r>
+          </a:p>
+          <a:p>
+            <a:pPr lvl="1" marL="622300" indent="-311150" defTabSz="408940">
+              <a:spcBef>
+                <a:spcPts val="2900"/>
+              </a:spcBef>
+              <a:defRPr sz="2200"/>
+            </a:pPr>
+            <a:r>
+              <a:t>Credit card is an editable card, but should also have some security settings</a:t>
+            </a:r>
+          </a:p>
+        </p:txBody>
+      </p:sp>
+      <p:pic>
+        <p:nvPicPr>
+          <p:cNvPr id="193" name="Billede" descr="Billede"/>
+          <p:cNvPicPr>
+            <a:picLocks noChangeAspect="1"/>
+          </p:cNvPicPr>
+          <p:nvPr/>
+        </p:nvPicPr>
+        <p:blipFill>
+          <a:blip r:embed="rId2">
+            <a:extLst/>
+          </a:blip>
+          <a:stretch>
+            <a:fillRect/>
+          </a:stretch>
+        </p:blipFill>
         <p:spPr>
           <a:xfrm>
-            <a:off x="150139" y="6673850"/>
-            <a:ext cx="12704522" cy="444501"/>
+            <a:off x="4952900" y="7266433"/>
+            <a:ext cx="2540001" cy="2540002"/>
           </a:xfrm>
           <a:prstGeom prst="rect">
             <a:avLst/>
           </a:prstGeom>
-        </p:spPr>
-        <p:txBody>
-          <a:bodyPr/>
-          <a:lstStyle/>
-          <a:p>
-            <a:pPr/>
-            <a:r>
-              <a:t>  empty contains 1 </a:t>
-            </a:r>
-          </a:p>
-        </p:txBody>
-      </p:sp>
+          <a:ln w="12700">
+            <a:miter lim="400000"/>
+          </a:ln>
+        </p:spPr>
+      </p:pic>
     </p:spTree>
   </p:cSld>
   <p:clrMapOvr>
@@ -7220,7 +7093,7 @@
       </p:grpSpPr>
       <p:sp>
         <p:nvSpPr>
-          <p:cNvPr id="194" name="Packages"/>
+          <p:cNvPr id="195" name="Packages"/>
           <p:cNvSpPr txBox="1"/>
           <p:nvPr>
             <p:ph type="title"/>
@@ -7244,7 +7117,7 @@
       </p:sp>
       <p:sp>
         <p:nvSpPr>
-          <p:cNvPr id="195" name="Stay organized - use packages…"/>
+          <p:cNvPr id="196" name="Stay organized - use packages…"/>
           <p:cNvSpPr txBox="1"/>
           <p:nvPr>
             <p:ph type="body" sz="half" idx="1"/>
@@ -7285,7 +7158,7 @@
       </p:sp>
       <p:sp>
         <p:nvSpPr>
-          <p:cNvPr id="196" name="package dk.lundogbendsen.scala.hello…"/>
+          <p:cNvPr id="197" name="package dk.lundogbendsen.scala.hello…"/>
           <p:cNvSpPr txBox="1"/>
           <p:nvPr>
             <p:ph type="body" idx="13"/>
@@ -7357,7 +7230,7 @@
       </p:grpSpPr>
       <p:sp>
         <p:nvSpPr>
-          <p:cNvPr id="198" name="Import"/>
+          <p:cNvPr id="199" name="Import"/>
           <p:cNvSpPr txBox="1"/>
           <p:nvPr>
             <p:ph type="title"/>
@@ -7381,7 +7254,7 @@
       </p:sp>
       <p:sp>
         <p:nvSpPr>
-          <p:cNvPr id="199" name="Use import to avoid typing the fully qualified class name…"/>
+          <p:cNvPr id="200" name="Use import to avoid typing the fully qualified class name…"/>
           <p:cNvSpPr txBox="1"/>
           <p:nvPr>
             <p:ph type="body" sz="half" idx="1"/>
@@ -7417,7 +7290,7 @@
       </p:sp>
       <p:sp>
         <p:nvSpPr>
-          <p:cNvPr id="200" name="import dk.lundogbendsen.hello.Hello // imports just Hello…"/>
+          <p:cNvPr id="201" name="import dk.lundogbendsen.hello.Hello // imports just Hello…"/>
           <p:cNvSpPr txBox="1"/>
           <p:nvPr>
             <p:ph type="body" idx="13"/>

</xml_diff>